<commit_message>
submit the final version
</commit_message>
<xml_diff>
--- a/上西大上的组-答辩ppt.pptx
+++ b/上西大上的组-答辩ppt.pptx
@@ -213,7 +213,7 @@
           <a:p>
             <a:fld id="{112E545F-6064-41EC-B817-D541A3D98FB7}" type="datetimeFigureOut">
               <a:rPr lang="zh-CN" altLang="en-US" smtClean="0"/>
-              <a:t>2023/5/5</a:t>
+              <a:t>2023/5/7</a:t>
             </a:fld>
             <a:endParaRPr lang="zh-CN" altLang="en-US"/>
           </a:p>
@@ -780,7 +780,7 @@
           <a:p>
             <a:fld id="{C244AE87-356B-4676-A72D-2ACC436576C9}" type="datetimeFigureOut">
               <a:rPr lang="zh-CN" altLang="en-US" smtClean="0"/>
-              <a:t>2023/5/5</a:t>
+              <a:t>2023/5/7</a:t>
             </a:fld>
             <a:endParaRPr lang="zh-CN" altLang="en-US"/>
           </a:p>
@@ -950,7 +950,7 @@
           <a:p>
             <a:fld id="{C244AE87-356B-4676-A72D-2ACC436576C9}" type="datetimeFigureOut">
               <a:rPr lang="zh-CN" altLang="en-US" smtClean="0"/>
-              <a:t>2023/5/5</a:t>
+              <a:t>2023/5/7</a:t>
             </a:fld>
             <a:endParaRPr lang="zh-CN" altLang="en-US"/>
           </a:p>
@@ -1130,7 +1130,7 @@
           <a:p>
             <a:fld id="{C244AE87-356B-4676-A72D-2ACC436576C9}" type="datetimeFigureOut">
               <a:rPr lang="zh-CN" altLang="en-US" smtClean="0"/>
-              <a:t>2023/5/5</a:t>
+              <a:t>2023/5/7</a:t>
             </a:fld>
             <a:endParaRPr lang="zh-CN" altLang="en-US"/>
           </a:p>
@@ -1300,7 +1300,7 @@
           <a:p>
             <a:fld id="{C244AE87-356B-4676-A72D-2ACC436576C9}" type="datetimeFigureOut">
               <a:rPr lang="zh-CN" altLang="en-US" smtClean="0"/>
-              <a:t>2023/5/5</a:t>
+              <a:t>2023/5/7</a:t>
             </a:fld>
             <a:endParaRPr lang="zh-CN" altLang="en-US"/>
           </a:p>
@@ -1546,7 +1546,7 @@
           <a:p>
             <a:fld id="{C244AE87-356B-4676-A72D-2ACC436576C9}" type="datetimeFigureOut">
               <a:rPr lang="zh-CN" altLang="en-US" smtClean="0"/>
-              <a:t>2023/5/5</a:t>
+              <a:t>2023/5/7</a:t>
             </a:fld>
             <a:endParaRPr lang="zh-CN" altLang="en-US"/>
           </a:p>
@@ -1778,7 +1778,7 @@
           <a:p>
             <a:fld id="{C244AE87-356B-4676-A72D-2ACC436576C9}" type="datetimeFigureOut">
               <a:rPr lang="zh-CN" altLang="en-US" smtClean="0"/>
-              <a:t>2023/5/5</a:t>
+              <a:t>2023/5/7</a:t>
             </a:fld>
             <a:endParaRPr lang="zh-CN" altLang="en-US"/>
           </a:p>
@@ -2145,7 +2145,7 @@
           <a:p>
             <a:fld id="{C244AE87-356B-4676-A72D-2ACC436576C9}" type="datetimeFigureOut">
               <a:rPr lang="zh-CN" altLang="en-US" smtClean="0"/>
-              <a:t>2023/5/5</a:t>
+              <a:t>2023/5/7</a:t>
             </a:fld>
             <a:endParaRPr lang="zh-CN" altLang="en-US"/>
           </a:p>
@@ -2263,7 +2263,7 @@
           <a:p>
             <a:fld id="{C244AE87-356B-4676-A72D-2ACC436576C9}" type="datetimeFigureOut">
               <a:rPr lang="zh-CN" altLang="en-US" smtClean="0"/>
-              <a:t>2023/5/5</a:t>
+              <a:t>2023/5/7</a:t>
             </a:fld>
             <a:endParaRPr lang="zh-CN" altLang="en-US"/>
           </a:p>
@@ -2358,7 +2358,7 @@
           <a:p>
             <a:fld id="{C244AE87-356B-4676-A72D-2ACC436576C9}" type="datetimeFigureOut">
               <a:rPr lang="zh-CN" altLang="en-US" smtClean="0"/>
-              <a:t>2023/5/5</a:t>
+              <a:t>2023/5/7</a:t>
             </a:fld>
             <a:endParaRPr lang="zh-CN" altLang="en-US"/>
           </a:p>
@@ -2635,7 +2635,7 @@
           <a:p>
             <a:fld id="{C244AE87-356B-4676-A72D-2ACC436576C9}" type="datetimeFigureOut">
               <a:rPr lang="zh-CN" altLang="en-US" smtClean="0"/>
-              <a:t>2023/5/5</a:t>
+              <a:t>2023/5/7</a:t>
             </a:fld>
             <a:endParaRPr lang="zh-CN" altLang="en-US"/>
           </a:p>
@@ -2888,7 +2888,7 @@
           <a:p>
             <a:fld id="{C244AE87-356B-4676-A72D-2ACC436576C9}" type="datetimeFigureOut">
               <a:rPr lang="zh-CN" altLang="en-US" smtClean="0"/>
-              <a:t>2023/5/5</a:t>
+              <a:t>2023/5/7</a:t>
             </a:fld>
             <a:endParaRPr lang="zh-CN" altLang="en-US"/>
           </a:p>
@@ -3131,7 +3131,7 @@
           <a:p>
             <a:fld id="{C244AE87-356B-4676-A72D-2ACC436576C9}" type="datetimeFigureOut">
               <a:rPr lang="zh-CN" altLang="en-US" smtClean="0"/>
-              <a:t>2023/5/5</a:t>
+              <a:t>2023/5/7</a:t>
             </a:fld>
             <a:endParaRPr lang="zh-CN" altLang="en-US"/>
           </a:p>
@@ -5628,13 +5628,13 @@
   <p:clrMapOvr>
     <a:masterClrMapping/>
   </p:clrMapOvr>
-  <mc:AlternateContent xmlns:mc="http://schemas.openxmlformats.org/markup-compatibility/2006">
-    <mc:Choice xmlns:p14="http://schemas.microsoft.com/office/powerpoint/2010/main" Requires="p14">
+  <mc:AlternateContent xmlns:mc="http://schemas.openxmlformats.org/markup-compatibility/2006" xmlns:p14="http://schemas.microsoft.com/office/powerpoint/2010/main">
+    <mc:Choice Requires="p14">
       <p:transition spd="slow" p14:dur="3400">
         <p14:reveal/>
       </p:transition>
     </mc:Choice>
-    <mc:Fallback>
+    <mc:Fallback xmlns="">
       <p:transition spd="slow">
         <p:fade/>
       </p:transition>
@@ -6580,13 +6580,13 @@
   <p:clrMapOvr>
     <a:masterClrMapping/>
   </p:clrMapOvr>
-  <mc:AlternateContent xmlns:mc="http://schemas.openxmlformats.org/markup-compatibility/2006">
-    <mc:Choice xmlns:p14="http://schemas.microsoft.com/office/powerpoint/2010/main" Requires="p14">
+  <mc:AlternateContent xmlns:mc="http://schemas.openxmlformats.org/markup-compatibility/2006" xmlns:p14="http://schemas.microsoft.com/office/powerpoint/2010/main">
+    <mc:Choice Requires="p14">
       <p:transition spd="slow" p14:dur="1500">
         <p:split orient="vert"/>
       </p:transition>
     </mc:Choice>
-    <mc:Fallback>
+    <mc:Fallback xmlns="">
       <p:transition spd="slow">
         <p:split orient="vert"/>
       </p:transition>
@@ -7608,6 +7608,37 @@
           </a:prstGeom>
         </p:spPr>
       </p:pic>
+      <p:sp>
+        <p:nvSpPr>
+          <p:cNvPr id="2" name="矩形 1"/>
+          <p:cNvSpPr/>
+          <p:nvPr/>
+        </p:nvSpPr>
+        <p:spPr>
+          <a:xfrm>
+            <a:off x="6713469" y="776709"/>
+            <a:ext cx="4703532" cy="369332"/>
+          </a:xfrm>
+          <a:prstGeom prst="rect">
+            <a:avLst/>
+          </a:prstGeom>
+        </p:spPr>
+        <p:txBody>
+          <a:bodyPr wrap="none">
+            <a:spAutoFit/>
+          </a:bodyPr>
+          <a:lstStyle/>
+          <a:p>
+            <a:r>
+              <a:rPr lang="en-US" altLang="zh-CN">
+                <a:hlinkClick r:id="rId4"/>
+              </a:rPr>
+              <a:t>https://github.com/shineshuo/Library-System</a:t>
+            </a:r>
+            <a:endParaRPr lang="zh-CN" altLang="en-US"/>
+          </a:p>
+        </p:txBody>
+      </p:sp>
     </p:spTree>
     <p:extLst>
       <p:ext uri="{BB962C8B-B14F-4D97-AF65-F5344CB8AC3E}">
@@ -7618,13 +7649,13 @@
   <p:clrMapOvr>
     <a:masterClrMapping/>
   </p:clrMapOvr>
-  <mc:AlternateContent xmlns:mc="http://schemas.openxmlformats.org/markup-compatibility/2006">
-    <mc:Choice xmlns:p15="http://schemas.microsoft.com/office/powerpoint/2012/main" Requires="p15">
+  <mc:AlternateContent xmlns:mc="http://schemas.openxmlformats.org/markup-compatibility/2006" xmlns:p15="http://schemas.microsoft.com/office/powerpoint/2012/main">
+    <mc:Choice Requires="p15">
       <p:transition xmlns:p14="http://schemas.microsoft.com/office/powerpoint/2010/main" spd="slow" p14:dur="6000">
         <p15:prstTrans prst="curtains"/>
       </p:transition>
     </mc:Choice>
-    <mc:Fallback>
+    <mc:Fallback xmlns="">
       <p:transition spd="slow">
         <p:fade/>
       </p:transition>
@@ -13082,13 +13113,13 @@
   <p:clrMapOvr>
     <a:masterClrMapping/>
   </p:clrMapOvr>
-  <mc:AlternateContent xmlns:mc="http://schemas.openxmlformats.org/markup-compatibility/2006">
-    <mc:Choice xmlns:p14="http://schemas.microsoft.com/office/powerpoint/2010/main" Requires="p14">
+  <mc:AlternateContent xmlns:mc="http://schemas.openxmlformats.org/markup-compatibility/2006" xmlns:p14="http://schemas.microsoft.com/office/powerpoint/2010/main">
+    <mc:Choice Requires="p14">
       <p:transition spd="slow" p14:dur="2500">
         <p:checker/>
       </p:transition>
     </mc:Choice>
-    <mc:Fallback>
+    <mc:Fallback xmlns="">
       <p:transition spd="slow">
         <p:checker/>
       </p:transition>
@@ -17103,6 +17134,104 @@
           </a:p>
         </p:txBody>
       </p:sp>
+      <p:pic>
+        <p:nvPicPr>
+          <p:cNvPr id="3" name="图片 2"/>
+          <p:cNvPicPr>
+            <a:picLocks noChangeAspect="1"/>
+          </p:cNvPicPr>
+          <p:nvPr/>
+        </p:nvPicPr>
+        <p:blipFill>
+          <a:blip r:embed="rId2" cstate="print">
+            <a:extLst>
+              <a:ext uri="{28A0092B-C50C-407E-A947-70E740481C1C}">
+                <a14:useLocalDpi xmlns:a14="http://schemas.microsoft.com/office/drawing/2010/main" val="0"/>
+              </a:ext>
+            </a:extLst>
+          </a:blip>
+          <a:stretch>
+            <a:fillRect/>
+          </a:stretch>
+        </p:blipFill>
+        <p:spPr>
+          <a:xfrm>
+            <a:off x="3101645" y="1539539"/>
+            <a:ext cx="6142711" cy="4607033"/>
+          </a:xfrm>
+          <a:prstGeom prst="rect">
+            <a:avLst/>
+          </a:prstGeom>
+        </p:spPr>
+      </p:pic>
+      <p:sp>
+        <p:nvSpPr>
+          <p:cNvPr id="4" name="文本框 3"/>
+          <p:cNvSpPr txBox="1"/>
+          <p:nvPr/>
+        </p:nvSpPr>
+        <p:spPr>
+          <a:xfrm>
+            <a:off x="592015" y="2543908"/>
+            <a:ext cx="1460656" cy="923330"/>
+          </a:xfrm>
+          <a:prstGeom prst="rect">
+            <a:avLst/>
+          </a:prstGeom>
+          <a:noFill/>
+        </p:spPr>
+        <p:txBody>
+          <a:bodyPr wrap="none" rtlCol="0">
+            <a:spAutoFit/>
+          </a:bodyPr>
+          <a:lstStyle/>
+          <a:p>
+            <a:r>
+              <a:rPr lang="zh-CN" altLang="en-US" smtClean="0"/>
+              <a:t>左</a:t>
+            </a:r>
+            <a:r>
+              <a:rPr lang="en-US" altLang="zh-CN" smtClean="0"/>
+              <a:t>1</a:t>
+            </a:r>
+            <a:r>
+              <a:rPr lang="zh-CN" altLang="en-US" smtClean="0"/>
+              <a:t>：李聪</a:t>
+            </a:r>
+            <a:endParaRPr lang="en-US" altLang="zh-CN" smtClean="0"/>
+          </a:p>
+          <a:p>
+            <a:r>
+              <a:rPr lang="zh-CN" altLang="en-US" smtClean="0"/>
+              <a:t>左</a:t>
+            </a:r>
+            <a:r>
+              <a:rPr lang="en-US" altLang="zh-CN" smtClean="0"/>
+              <a:t>2</a:t>
+            </a:r>
+            <a:r>
+              <a:rPr lang="zh-CN" altLang="en-US" smtClean="0"/>
+              <a:t>：程京涛</a:t>
+            </a:r>
+            <a:endParaRPr lang="en-US" altLang="zh-CN" smtClean="0"/>
+          </a:p>
+          <a:p>
+            <a:r>
+              <a:rPr lang="zh-CN" altLang="en-US" smtClean="0"/>
+              <a:t>左</a:t>
+            </a:r>
+            <a:r>
+              <a:rPr lang="en-US" altLang="zh-CN" smtClean="0"/>
+              <a:t>3</a:t>
+            </a:r>
+            <a:r>
+              <a:rPr lang="zh-CN" altLang="en-US" smtClean="0"/>
+              <a:t>：赵恩烁</a:t>
+            </a:r>
+            <a:endParaRPr lang="zh-CN" altLang="en-US"/>
+          </a:p>
+        </p:txBody>
+      </p:sp>
     </p:spTree>
     <p:extLst>
       <p:ext uri="{BB962C8B-B14F-4D97-AF65-F5344CB8AC3E}">
@@ -17113,13 +17242,13 @@
   <p:clrMapOvr>
     <a:masterClrMapping/>
   </p:clrMapOvr>
-  <mc:AlternateContent xmlns:mc="http://schemas.openxmlformats.org/markup-compatibility/2006">
-    <mc:Choice xmlns:p14="http://schemas.microsoft.com/office/powerpoint/2010/main" Requires="p14">
+  <mc:AlternateContent xmlns:mc="http://schemas.openxmlformats.org/markup-compatibility/2006" xmlns:p14="http://schemas.microsoft.com/office/powerpoint/2010/main">
+    <mc:Choice Requires="p14">
       <p:transition spd="slow" p14:dur="1500">
         <p:split orient="vert"/>
       </p:transition>
     </mc:Choice>
-    <mc:Fallback>
+    <mc:Fallback xmlns="">
       <p:transition spd="slow">
         <p:split orient="vert"/>
       </p:transition>
@@ -20425,13 +20554,13 @@
   <p:clrMapOvr>
     <a:masterClrMapping/>
   </p:clrMapOvr>
-  <mc:AlternateContent xmlns:mc="http://schemas.openxmlformats.org/markup-compatibility/2006">
-    <mc:Choice xmlns:p15="http://schemas.microsoft.com/office/powerpoint/2012/main" Requires="p15">
+  <mc:AlternateContent xmlns:mc="http://schemas.openxmlformats.org/markup-compatibility/2006" xmlns:p15="http://schemas.microsoft.com/office/powerpoint/2012/main">
+    <mc:Choice Requires="p15">
       <p:transition xmlns:p14="http://schemas.microsoft.com/office/powerpoint/2010/main" spd="slow" p14:dur="2000">
         <p15:prstTrans prst="drape"/>
       </p:transition>
     </mc:Choice>
-    <mc:Fallback>
+    <mc:Fallback xmlns="">
       <p:transition spd="slow">
         <p:fade/>
       </p:transition>
@@ -21148,13 +21277,13 @@
   <p:clrMapOvr>
     <a:masterClrMapping/>
   </p:clrMapOvr>
-  <mc:AlternateContent xmlns:mc="http://schemas.openxmlformats.org/markup-compatibility/2006">
-    <mc:Choice xmlns:p15="http://schemas.microsoft.com/office/powerpoint/2012/main" Requires="p15">
+  <mc:AlternateContent xmlns:mc="http://schemas.openxmlformats.org/markup-compatibility/2006" xmlns:p15="http://schemas.microsoft.com/office/powerpoint/2012/main">
+    <mc:Choice Requires="p15">
       <p:transition xmlns:p14="http://schemas.microsoft.com/office/powerpoint/2010/main" spd="slow" p14:dur="2000">
         <p15:prstTrans prst="fallOver"/>
       </p:transition>
     </mc:Choice>
-    <mc:Fallback>
+    <mc:Fallback xmlns="">
       <p:transition spd="slow">
         <p:fade/>
       </p:transition>

</xml_diff>